<commit_message>
small improvements to PCB docs
</commit_message>
<xml_diff>
--- a/builds/Arduino-shield-circuit-board.pptx
+++ b/builds/Arduino-shield-circuit-board.pptx
@@ -251,7 +251,7 @@
           <a:p>
             <a:fld id="{335F4E94-ADA5-4952-B4DB-EFBB58BCFC17}" type="datetimeFigureOut">
               <a:rPr lang="en-US" smtClean="0"/>
-              <a:t>8/14/2024</a:t>
+              <a:t>8/15/2024</a:t>
             </a:fld>
             <a:endParaRPr lang="en-US"/>
           </a:p>
@@ -421,7 +421,7 @@
           <a:p>
             <a:fld id="{335F4E94-ADA5-4952-B4DB-EFBB58BCFC17}" type="datetimeFigureOut">
               <a:rPr lang="en-US" smtClean="0"/>
-              <a:t>8/14/2024</a:t>
+              <a:t>8/15/2024</a:t>
             </a:fld>
             <a:endParaRPr lang="en-US"/>
           </a:p>
@@ -601,7 +601,7 @@
           <a:p>
             <a:fld id="{335F4E94-ADA5-4952-B4DB-EFBB58BCFC17}" type="datetimeFigureOut">
               <a:rPr lang="en-US" smtClean="0"/>
-              <a:t>8/14/2024</a:t>
+              <a:t>8/15/2024</a:t>
             </a:fld>
             <a:endParaRPr lang="en-US"/>
           </a:p>
@@ -771,7 +771,7 @@
           <a:p>
             <a:fld id="{335F4E94-ADA5-4952-B4DB-EFBB58BCFC17}" type="datetimeFigureOut">
               <a:rPr lang="en-US" smtClean="0"/>
-              <a:t>8/14/2024</a:t>
+              <a:t>8/15/2024</a:t>
             </a:fld>
             <a:endParaRPr lang="en-US"/>
           </a:p>
@@ -1015,7 +1015,7 @@
           <a:p>
             <a:fld id="{335F4E94-ADA5-4952-B4DB-EFBB58BCFC17}" type="datetimeFigureOut">
               <a:rPr lang="en-US" smtClean="0"/>
-              <a:t>8/14/2024</a:t>
+              <a:t>8/15/2024</a:t>
             </a:fld>
             <a:endParaRPr lang="en-US"/>
           </a:p>
@@ -1247,7 +1247,7 @@
           <a:p>
             <a:fld id="{335F4E94-ADA5-4952-B4DB-EFBB58BCFC17}" type="datetimeFigureOut">
               <a:rPr lang="en-US" smtClean="0"/>
-              <a:t>8/14/2024</a:t>
+              <a:t>8/15/2024</a:t>
             </a:fld>
             <a:endParaRPr lang="en-US"/>
           </a:p>
@@ -1614,7 +1614,7 @@
           <a:p>
             <a:fld id="{335F4E94-ADA5-4952-B4DB-EFBB58BCFC17}" type="datetimeFigureOut">
               <a:rPr lang="en-US" smtClean="0"/>
-              <a:t>8/14/2024</a:t>
+              <a:t>8/15/2024</a:t>
             </a:fld>
             <a:endParaRPr lang="en-US"/>
           </a:p>
@@ -1732,7 +1732,7 @@
           <a:p>
             <a:fld id="{335F4E94-ADA5-4952-B4DB-EFBB58BCFC17}" type="datetimeFigureOut">
               <a:rPr lang="en-US" smtClean="0"/>
-              <a:t>8/14/2024</a:t>
+              <a:t>8/15/2024</a:t>
             </a:fld>
             <a:endParaRPr lang="en-US"/>
           </a:p>
@@ -1827,7 +1827,7 @@
           <a:p>
             <a:fld id="{335F4E94-ADA5-4952-B4DB-EFBB58BCFC17}" type="datetimeFigureOut">
               <a:rPr lang="en-US" smtClean="0"/>
-              <a:t>8/14/2024</a:t>
+              <a:t>8/15/2024</a:t>
             </a:fld>
             <a:endParaRPr lang="en-US"/>
           </a:p>
@@ -2104,7 +2104,7 @@
           <a:p>
             <a:fld id="{335F4E94-ADA5-4952-B4DB-EFBB58BCFC17}" type="datetimeFigureOut">
               <a:rPr lang="en-US" smtClean="0"/>
-              <a:t>8/14/2024</a:t>
+              <a:t>8/15/2024</a:t>
             </a:fld>
             <a:endParaRPr lang="en-US"/>
           </a:p>
@@ -2361,7 +2361,7 @@
           <a:p>
             <a:fld id="{335F4E94-ADA5-4952-B4DB-EFBB58BCFC17}" type="datetimeFigureOut">
               <a:rPr lang="en-US" smtClean="0"/>
-              <a:t>8/14/2024</a:t>
+              <a:t>8/15/2024</a:t>
             </a:fld>
             <a:endParaRPr lang="en-US"/>
           </a:p>
@@ -2574,7 +2574,7 @@
           <a:p>
             <a:fld id="{335F4E94-ADA5-4952-B4DB-EFBB58BCFC17}" type="datetimeFigureOut">
               <a:rPr lang="en-US" smtClean="0"/>
-              <a:t>8/14/2024</a:t>
+              <a:t>8/15/2024</a:t>
             </a:fld>
             <a:endParaRPr lang="en-US"/>
           </a:p>

</xml_diff>